<commit_message>
J#27519: Added simple patient information model to illustrate example queries. Updated figure index to account for the new diagram.
</commit_message>
<xml_diff>
--- a/docs/CQLDiagrams.pptx
+++ b/docs/CQLDiagrams.pptx
@@ -6,6 +6,7 @@
   </p:sldMasterIdLst>
   <p:sldIdLst>
     <p:sldId id="256" r:id="rId2"/>
+    <p:sldId id="257" r:id="rId3"/>
   </p:sldIdLst>
   <p:sldSz cx="12192000" cy="6858000"/>
   <p:notesSz cx="6858000" cy="9144000"/>
@@ -259,7 +260,7 @@
           <a:p>
             <a:fld id="{B59D78E9-B5C3-4E6C-80B8-7F241F439C9B}" type="datetimeFigureOut">
               <a:rPr lang="en-US" smtClean="0"/>
-              <a:t>6/7/2019</a:t>
+              <a:t>8/17/2020</a:t>
             </a:fld>
             <a:endParaRPr lang="en-US"/>
           </a:p>
@@ -457,7 +458,7 @@
           <a:p>
             <a:fld id="{B59D78E9-B5C3-4E6C-80B8-7F241F439C9B}" type="datetimeFigureOut">
               <a:rPr lang="en-US" smtClean="0"/>
-              <a:t>6/7/2019</a:t>
+              <a:t>8/17/2020</a:t>
             </a:fld>
             <a:endParaRPr lang="en-US"/>
           </a:p>
@@ -665,7 +666,7 @@
           <a:p>
             <a:fld id="{B59D78E9-B5C3-4E6C-80B8-7F241F439C9B}" type="datetimeFigureOut">
               <a:rPr lang="en-US" smtClean="0"/>
-              <a:t>6/7/2019</a:t>
+              <a:t>8/17/2020</a:t>
             </a:fld>
             <a:endParaRPr lang="en-US"/>
           </a:p>
@@ -863,7 +864,7 @@
           <a:p>
             <a:fld id="{B59D78E9-B5C3-4E6C-80B8-7F241F439C9B}" type="datetimeFigureOut">
               <a:rPr lang="en-US" smtClean="0"/>
-              <a:t>6/7/2019</a:t>
+              <a:t>8/17/2020</a:t>
             </a:fld>
             <a:endParaRPr lang="en-US"/>
           </a:p>
@@ -1138,7 +1139,7 @@
           <a:p>
             <a:fld id="{B59D78E9-B5C3-4E6C-80B8-7F241F439C9B}" type="datetimeFigureOut">
               <a:rPr lang="en-US" smtClean="0"/>
-              <a:t>6/7/2019</a:t>
+              <a:t>8/17/2020</a:t>
             </a:fld>
             <a:endParaRPr lang="en-US"/>
           </a:p>
@@ -1403,7 +1404,7 @@
           <a:p>
             <a:fld id="{B59D78E9-B5C3-4E6C-80B8-7F241F439C9B}" type="datetimeFigureOut">
               <a:rPr lang="en-US" smtClean="0"/>
-              <a:t>6/7/2019</a:t>
+              <a:t>8/17/2020</a:t>
             </a:fld>
             <a:endParaRPr lang="en-US"/>
           </a:p>
@@ -1815,7 +1816,7 @@
           <a:p>
             <a:fld id="{B59D78E9-B5C3-4E6C-80B8-7F241F439C9B}" type="datetimeFigureOut">
               <a:rPr lang="en-US" smtClean="0"/>
-              <a:t>6/7/2019</a:t>
+              <a:t>8/17/2020</a:t>
             </a:fld>
             <a:endParaRPr lang="en-US"/>
           </a:p>
@@ -1956,7 +1957,7 @@
           <a:p>
             <a:fld id="{B59D78E9-B5C3-4E6C-80B8-7F241F439C9B}" type="datetimeFigureOut">
               <a:rPr lang="en-US" smtClean="0"/>
-              <a:t>6/7/2019</a:t>
+              <a:t>8/17/2020</a:t>
             </a:fld>
             <a:endParaRPr lang="en-US"/>
           </a:p>
@@ -2069,7 +2070,7 @@
           <a:p>
             <a:fld id="{B59D78E9-B5C3-4E6C-80B8-7F241F439C9B}" type="datetimeFigureOut">
               <a:rPr lang="en-US" smtClean="0"/>
-              <a:t>6/7/2019</a:t>
+              <a:t>8/17/2020</a:t>
             </a:fld>
             <a:endParaRPr lang="en-US"/>
           </a:p>
@@ -2380,7 +2381,7 @@
           <a:p>
             <a:fld id="{B59D78E9-B5C3-4E6C-80B8-7F241F439C9B}" type="datetimeFigureOut">
               <a:rPr lang="en-US" smtClean="0"/>
-              <a:t>6/7/2019</a:t>
+              <a:t>8/17/2020</a:t>
             </a:fld>
             <a:endParaRPr lang="en-US"/>
           </a:p>
@@ -2668,7 +2669,7 @@
           <a:p>
             <a:fld id="{B59D78E9-B5C3-4E6C-80B8-7F241F439C9B}" type="datetimeFigureOut">
               <a:rPr lang="en-US" smtClean="0"/>
-              <a:t>6/7/2019</a:t>
+              <a:t>8/17/2020</a:t>
             </a:fld>
             <a:endParaRPr lang="en-US"/>
           </a:p>
@@ -2909,7 +2910,7 @@
           <a:p>
             <a:fld id="{B59D78E9-B5C3-4E6C-80B8-7F241F439C9B}" type="datetimeFigureOut">
               <a:rPr lang="en-US" smtClean="0"/>
-              <a:t>6/7/2019</a:t>
+              <a:t>8/17/2020</a:t>
             </a:fld>
             <a:endParaRPr lang="en-US"/>
           </a:p>
@@ -4732,6 +4733,529 @@
 </p:sld>
 </file>
 
+<file path=ppt/slides/slide2.xml><?xml version="1.0" encoding="utf-8"?>
+<p:sld xmlns:a="http://schemas.openxmlformats.org/drawingml/2006/main" xmlns:r="http://schemas.openxmlformats.org/officeDocument/2006/relationships" xmlns:p="http://schemas.openxmlformats.org/presentationml/2006/main">
+  <p:cSld>
+    <p:spTree>
+      <p:nvGrpSpPr>
+        <p:cNvPr id="1" name=""/>
+        <p:cNvGrpSpPr/>
+        <p:nvPr/>
+      </p:nvGrpSpPr>
+      <p:grpSpPr>
+        <a:xfrm>
+          <a:off x="0" y="0"/>
+          <a:ext cx="0" cy="0"/>
+          <a:chOff x="0" y="0"/>
+          <a:chExt cx="0" cy="0"/>
+        </a:xfrm>
+      </p:grpSpPr>
+      <p:sp>
+        <p:nvSpPr>
+          <p:cNvPr id="4" name="Rectangle 3">
+            <a:extLst>
+              <a:ext uri="{FF2B5EF4-FFF2-40B4-BE49-F238E27FC236}">
+                <a16:creationId xmlns:a16="http://schemas.microsoft.com/office/drawing/2014/main" id="{19995E87-2F7A-434C-B6D1-661EB599E88D}"/>
+              </a:ext>
+            </a:extLst>
+          </p:cNvPr>
+          <p:cNvSpPr/>
+          <p:nvPr/>
+        </p:nvSpPr>
+        <p:spPr>
+          <a:xfrm>
+            <a:off x="2990335" y="914398"/>
+            <a:ext cx="2681413" cy="463378"/>
+          </a:xfrm>
+          <a:prstGeom prst="rect">
+            <a:avLst/>
+          </a:prstGeom>
+        </p:spPr>
+        <p:style>
+          <a:lnRef idx="2">
+            <a:schemeClr val="accent1">
+              <a:shade val="50000"/>
+            </a:schemeClr>
+          </a:lnRef>
+          <a:fillRef idx="1">
+            <a:schemeClr val="accent1"/>
+          </a:fillRef>
+          <a:effectRef idx="0">
+            <a:schemeClr val="accent1"/>
+          </a:effectRef>
+          <a:fontRef idx="minor">
+            <a:schemeClr val="lt1"/>
+          </a:fontRef>
+        </p:style>
+        <p:txBody>
+          <a:bodyPr rtlCol="0" anchor="ctr"/>
+          <a:lstStyle/>
+          <a:p>
+            <a:pPr algn="ctr"/>
+            <a:r>
+              <a:rPr lang="en-US" dirty="0"/>
+              <a:t>Patient</a:t>
+            </a:r>
+          </a:p>
+        </p:txBody>
+      </p:sp>
+      <p:sp>
+        <p:nvSpPr>
+          <p:cNvPr id="5" name="Rectangle 4">
+            <a:extLst>
+              <a:ext uri="{FF2B5EF4-FFF2-40B4-BE49-F238E27FC236}">
+                <a16:creationId xmlns:a16="http://schemas.microsoft.com/office/drawing/2014/main" id="{C8F09EF7-8C64-4DC8-A450-31434EB30D98}"/>
+              </a:ext>
+            </a:extLst>
+          </p:cNvPr>
+          <p:cNvSpPr/>
+          <p:nvPr/>
+        </p:nvSpPr>
+        <p:spPr>
+          <a:xfrm>
+            <a:off x="683744" y="1932292"/>
+            <a:ext cx="2681414" cy="463378"/>
+          </a:xfrm>
+          <a:prstGeom prst="rect">
+            <a:avLst/>
+          </a:prstGeom>
+        </p:spPr>
+        <p:style>
+          <a:lnRef idx="2">
+            <a:schemeClr val="accent1">
+              <a:shade val="50000"/>
+            </a:schemeClr>
+          </a:lnRef>
+          <a:fillRef idx="1">
+            <a:schemeClr val="accent1"/>
+          </a:fillRef>
+          <a:effectRef idx="0">
+            <a:schemeClr val="accent1"/>
+          </a:effectRef>
+          <a:fontRef idx="minor">
+            <a:schemeClr val="lt1"/>
+          </a:fontRef>
+        </p:style>
+        <p:txBody>
+          <a:bodyPr rtlCol="0" anchor="ctr"/>
+          <a:lstStyle/>
+          <a:p>
+            <a:pPr algn="ctr"/>
+            <a:r>
+              <a:rPr lang="en-US" dirty="0"/>
+              <a:t>Encounter</a:t>
+            </a:r>
+          </a:p>
+        </p:txBody>
+      </p:sp>
+      <p:sp>
+        <p:nvSpPr>
+          <p:cNvPr id="6" name="Rectangle 5">
+            <a:extLst>
+              <a:ext uri="{FF2B5EF4-FFF2-40B4-BE49-F238E27FC236}">
+                <a16:creationId xmlns:a16="http://schemas.microsoft.com/office/drawing/2014/main" id="{17BB6744-A2C1-4E13-8515-D1D086EB9069}"/>
+              </a:ext>
+            </a:extLst>
+          </p:cNvPr>
+          <p:cNvSpPr/>
+          <p:nvPr/>
+        </p:nvSpPr>
+        <p:spPr>
+          <a:xfrm>
+            <a:off x="1198603" y="2934734"/>
+            <a:ext cx="2681415" cy="463378"/>
+          </a:xfrm>
+          <a:prstGeom prst="rect">
+            <a:avLst/>
+          </a:prstGeom>
+        </p:spPr>
+        <p:style>
+          <a:lnRef idx="2">
+            <a:schemeClr val="accent1">
+              <a:shade val="50000"/>
+            </a:schemeClr>
+          </a:lnRef>
+          <a:fillRef idx="1">
+            <a:schemeClr val="accent1"/>
+          </a:fillRef>
+          <a:effectRef idx="0">
+            <a:schemeClr val="accent1"/>
+          </a:effectRef>
+          <a:fontRef idx="minor">
+            <a:schemeClr val="lt1"/>
+          </a:fontRef>
+        </p:style>
+        <p:txBody>
+          <a:bodyPr rtlCol="0" anchor="ctr"/>
+          <a:lstStyle/>
+          <a:p>
+            <a:pPr algn="ctr"/>
+            <a:r>
+              <a:rPr lang="en-US" dirty="0"/>
+              <a:t>Condition</a:t>
+            </a:r>
+          </a:p>
+        </p:txBody>
+      </p:sp>
+      <p:sp>
+        <p:nvSpPr>
+          <p:cNvPr id="7" name="Rectangle 6">
+            <a:extLst>
+              <a:ext uri="{FF2B5EF4-FFF2-40B4-BE49-F238E27FC236}">
+                <a16:creationId xmlns:a16="http://schemas.microsoft.com/office/drawing/2014/main" id="{94B9381E-BE49-49D3-9974-F5285D00B3CD}"/>
+              </a:ext>
+            </a:extLst>
+          </p:cNvPr>
+          <p:cNvSpPr/>
+          <p:nvPr/>
+        </p:nvSpPr>
+        <p:spPr>
+          <a:xfrm>
+            <a:off x="5132173" y="1950827"/>
+            <a:ext cx="2681417" cy="463378"/>
+          </a:xfrm>
+          <a:prstGeom prst="rect">
+            <a:avLst/>
+          </a:prstGeom>
+        </p:spPr>
+        <p:style>
+          <a:lnRef idx="2">
+            <a:schemeClr val="accent1">
+              <a:shade val="50000"/>
+            </a:schemeClr>
+          </a:lnRef>
+          <a:fillRef idx="1">
+            <a:schemeClr val="accent1"/>
+          </a:fillRef>
+          <a:effectRef idx="0">
+            <a:schemeClr val="accent1"/>
+          </a:effectRef>
+          <a:fontRef idx="minor">
+            <a:schemeClr val="lt1"/>
+          </a:fontRef>
+        </p:style>
+        <p:txBody>
+          <a:bodyPr rtlCol="0" anchor="ctr"/>
+          <a:lstStyle/>
+          <a:p>
+            <a:pPr algn="ctr"/>
+            <a:r>
+              <a:rPr lang="en-US" dirty="0" err="1"/>
+              <a:t>MedicationRequest</a:t>
+            </a:r>
+            <a:endParaRPr lang="en-US" dirty="0"/>
+          </a:p>
+        </p:txBody>
+      </p:sp>
+      <p:sp>
+        <p:nvSpPr>
+          <p:cNvPr id="8" name="Rectangle 7">
+            <a:extLst>
+              <a:ext uri="{FF2B5EF4-FFF2-40B4-BE49-F238E27FC236}">
+                <a16:creationId xmlns:a16="http://schemas.microsoft.com/office/drawing/2014/main" id="{5C1F05BD-A3B7-4D4D-B8E1-77F846EF56ED}"/>
+              </a:ext>
+            </a:extLst>
+          </p:cNvPr>
+          <p:cNvSpPr/>
+          <p:nvPr/>
+        </p:nvSpPr>
+        <p:spPr>
+          <a:xfrm>
+            <a:off x="4551405" y="2962542"/>
+            <a:ext cx="2681417" cy="463378"/>
+          </a:xfrm>
+          <a:prstGeom prst="rect">
+            <a:avLst/>
+          </a:prstGeom>
+        </p:spPr>
+        <p:style>
+          <a:lnRef idx="2">
+            <a:schemeClr val="accent1">
+              <a:shade val="50000"/>
+            </a:schemeClr>
+          </a:lnRef>
+          <a:fillRef idx="1">
+            <a:schemeClr val="accent1"/>
+          </a:fillRef>
+          <a:effectRef idx="0">
+            <a:schemeClr val="accent1"/>
+          </a:effectRef>
+          <a:fontRef idx="minor">
+            <a:schemeClr val="lt1"/>
+          </a:fontRef>
+        </p:style>
+        <p:txBody>
+          <a:bodyPr rtlCol="0" anchor="ctr"/>
+          <a:lstStyle/>
+          <a:p>
+            <a:pPr algn="ctr"/>
+            <a:r>
+              <a:rPr lang="en-US" dirty="0" err="1"/>
+              <a:t>MedicationDispense</a:t>
+            </a:r>
+            <a:endParaRPr lang="en-US" dirty="0"/>
+          </a:p>
+        </p:txBody>
+      </p:sp>
+      <p:cxnSp>
+        <p:nvCxnSpPr>
+          <p:cNvPr id="10" name="Straight Arrow Connector 9">
+            <a:extLst>
+              <a:ext uri="{FF2B5EF4-FFF2-40B4-BE49-F238E27FC236}">
+                <a16:creationId xmlns:a16="http://schemas.microsoft.com/office/drawing/2014/main" id="{3BEEFAC8-7BA9-44E5-AAC4-6A6B7B747DD6}"/>
+              </a:ext>
+            </a:extLst>
+          </p:cNvPr>
+          <p:cNvCxnSpPr>
+            <a:cxnSpLocks/>
+          </p:cNvCxnSpPr>
+          <p:nvPr/>
+        </p:nvCxnSpPr>
+        <p:spPr>
+          <a:xfrm flipV="1">
+            <a:off x="3175686" y="1408669"/>
+            <a:ext cx="0" cy="548337"/>
+          </a:xfrm>
+          <a:prstGeom prst="straightConnector1">
+            <a:avLst/>
+          </a:prstGeom>
+          <a:ln>
+            <a:tailEnd type="triangle"/>
+          </a:ln>
+        </p:spPr>
+        <p:style>
+          <a:lnRef idx="3">
+            <a:schemeClr val="accent1"/>
+          </a:lnRef>
+          <a:fillRef idx="0">
+            <a:schemeClr val="accent1"/>
+          </a:fillRef>
+          <a:effectRef idx="2">
+            <a:schemeClr val="accent1"/>
+          </a:effectRef>
+          <a:fontRef idx="minor">
+            <a:schemeClr val="tx1"/>
+          </a:fontRef>
+        </p:style>
+      </p:cxnSp>
+      <p:cxnSp>
+        <p:nvCxnSpPr>
+          <p:cNvPr id="11" name="Straight Arrow Connector 10">
+            <a:extLst>
+              <a:ext uri="{FF2B5EF4-FFF2-40B4-BE49-F238E27FC236}">
+                <a16:creationId xmlns:a16="http://schemas.microsoft.com/office/drawing/2014/main" id="{5A6D500F-5A48-4382-A097-4924860BB563}"/>
+              </a:ext>
+            </a:extLst>
+          </p:cNvPr>
+          <p:cNvCxnSpPr>
+            <a:cxnSpLocks/>
+          </p:cNvCxnSpPr>
+          <p:nvPr/>
+        </p:nvCxnSpPr>
+        <p:spPr>
+          <a:xfrm flipV="1">
+            <a:off x="3711146" y="1408669"/>
+            <a:ext cx="0" cy="1532243"/>
+          </a:xfrm>
+          <a:prstGeom prst="straightConnector1">
+            <a:avLst/>
+          </a:prstGeom>
+          <a:ln>
+            <a:tailEnd type="triangle"/>
+          </a:ln>
+        </p:spPr>
+        <p:style>
+          <a:lnRef idx="3">
+            <a:schemeClr val="accent1"/>
+          </a:lnRef>
+          <a:fillRef idx="0">
+            <a:schemeClr val="accent1"/>
+          </a:fillRef>
+          <a:effectRef idx="2">
+            <a:schemeClr val="accent1"/>
+          </a:effectRef>
+          <a:fontRef idx="minor">
+            <a:schemeClr val="tx1"/>
+          </a:fontRef>
+        </p:style>
+      </p:cxnSp>
+      <p:cxnSp>
+        <p:nvCxnSpPr>
+          <p:cNvPr id="13" name="Straight Arrow Connector 12">
+            <a:extLst>
+              <a:ext uri="{FF2B5EF4-FFF2-40B4-BE49-F238E27FC236}">
+                <a16:creationId xmlns:a16="http://schemas.microsoft.com/office/drawing/2014/main" id="{52265720-64F8-4F8C-BB35-2342AD6BF0A5}"/>
+              </a:ext>
+            </a:extLst>
+          </p:cNvPr>
+          <p:cNvCxnSpPr>
+            <a:cxnSpLocks/>
+          </p:cNvCxnSpPr>
+          <p:nvPr/>
+        </p:nvCxnSpPr>
+        <p:spPr>
+          <a:xfrm flipV="1">
+            <a:off x="4790304" y="1408669"/>
+            <a:ext cx="0" cy="1556957"/>
+          </a:xfrm>
+          <a:prstGeom prst="straightConnector1">
+            <a:avLst/>
+          </a:prstGeom>
+          <a:ln>
+            <a:tailEnd type="triangle"/>
+          </a:ln>
+        </p:spPr>
+        <p:style>
+          <a:lnRef idx="3">
+            <a:schemeClr val="accent1"/>
+          </a:lnRef>
+          <a:fillRef idx="0">
+            <a:schemeClr val="accent1"/>
+          </a:fillRef>
+          <a:effectRef idx="2">
+            <a:schemeClr val="accent1"/>
+          </a:effectRef>
+          <a:fontRef idx="minor">
+            <a:schemeClr val="tx1"/>
+          </a:fontRef>
+        </p:style>
+      </p:cxnSp>
+      <p:cxnSp>
+        <p:nvCxnSpPr>
+          <p:cNvPr id="15" name="Straight Arrow Connector 14">
+            <a:extLst>
+              <a:ext uri="{FF2B5EF4-FFF2-40B4-BE49-F238E27FC236}">
+                <a16:creationId xmlns:a16="http://schemas.microsoft.com/office/drawing/2014/main" id="{A00690D0-2DBE-44F6-8191-2D68C588BC43}"/>
+              </a:ext>
+            </a:extLst>
+          </p:cNvPr>
+          <p:cNvCxnSpPr>
+            <a:cxnSpLocks/>
+          </p:cNvCxnSpPr>
+          <p:nvPr/>
+        </p:nvCxnSpPr>
+        <p:spPr>
+          <a:xfrm flipV="1">
+            <a:off x="5342238" y="1408669"/>
+            <a:ext cx="0" cy="548337"/>
+          </a:xfrm>
+          <a:prstGeom prst="straightConnector1">
+            <a:avLst/>
+          </a:prstGeom>
+          <a:ln>
+            <a:tailEnd type="triangle"/>
+          </a:ln>
+        </p:spPr>
+        <p:style>
+          <a:lnRef idx="3">
+            <a:schemeClr val="accent1"/>
+          </a:lnRef>
+          <a:fillRef idx="0">
+            <a:schemeClr val="accent1"/>
+          </a:fillRef>
+          <a:effectRef idx="2">
+            <a:schemeClr val="accent1"/>
+          </a:effectRef>
+          <a:fontRef idx="minor">
+            <a:schemeClr val="tx1"/>
+          </a:fontRef>
+        </p:style>
+      </p:cxnSp>
+      <p:cxnSp>
+        <p:nvCxnSpPr>
+          <p:cNvPr id="16" name="Straight Arrow Connector 15">
+            <a:extLst>
+              <a:ext uri="{FF2B5EF4-FFF2-40B4-BE49-F238E27FC236}">
+                <a16:creationId xmlns:a16="http://schemas.microsoft.com/office/drawing/2014/main" id="{5568E507-CFF8-44EB-B410-5AE8CAEF0359}"/>
+              </a:ext>
+            </a:extLst>
+          </p:cNvPr>
+          <p:cNvCxnSpPr>
+            <a:cxnSpLocks/>
+          </p:cNvCxnSpPr>
+          <p:nvPr/>
+        </p:nvCxnSpPr>
+        <p:spPr>
+          <a:xfrm flipV="1">
+            <a:off x="3167448" y="2435825"/>
+            <a:ext cx="0" cy="548337"/>
+          </a:xfrm>
+          <a:prstGeom prst="straightConnector1">
+            <a:avLst/>
+          </a:prstGeom>
+          <a:ln>
+            <a:tailEnd type="triangle"/>
+          </a:ln>
+        </p:spPr>
+        <p:style>
+          <a:lnRef idx="3">
+            <a:schemeClr val="accent1"/>
+          </a:lnRef>
+          <a:fillRef idx="0">
+            <a:schemeClr val="accent1"/>
+          </a:fillRef>
+          <a:effectRef idx="2">
+            <a:schemeClr val="accent1"/>
+          </a:effectRef>
+          <a:fontRef idx="minor">
+            <a:schemeClr val="tx1"/>
+          </a:fontRef>
+        </p:style>
+      </p:cxnSp>
+      <p:cxnSp>
+        <p:nvCxnSpPr>
+          <p:cNvPr id="17" name="Straight Arrow Connector 16">
+            <a:extLst>
+              <a:ext uri="{FF2B5EF4-FFF2-40B4-BE49-F238E27FC236}">
+                <a16:creationId xmlns:a16="http://schemas.microsoft.com/office/drawing/2014/main" id="{D3F0F628-3F3D-4EC8-BBCB-42D63B426347}"/>
+              </a:ext>
+            </a:extLst>
+          </p:cNvPr>
+          <p:cNvCxnSpPr>
+            <a:cxnSpLocks/>
+          </p:cNvCxnSpPr>
+          <p:nvPr/>
+        </p:nvCxnSpPr>
+        <p:spPr>
+          <a:xfrm flipV="1">
+            <a:off x="5350475" y="2435825"/>
+            <a:ext cx="0" cy="548337"/>
+          </a:xfrm>
+          <a:prstGeom prst="straightConnector1">
+            <a:avLst/>
+          </a:prstGeom>
+          <a:ln>
+            <a:tailEnd type="triangle"/>
+          </a:ln>
+        </p:spPr>
+        <p:style>
+          <a:lnRef idx="3">
+            <a:schemeClr val="accent1"/>
+          </a:lnRef>
+          <a:fillRef idx="0">
+            <a:schemeClr val="accent1"/>
+          </a:fillRef>
+          <a:effectRef idx="2">
+            <a:schemeClr val="accent1"/>
+          </a:effectRef>
+          <a:fontRef idx="minor">
+            <a:schemeClr val="tx1"/>
+          </a:fontRef>
+        </p:style>
+      </p:cxnSp>
+    </p:spTree>
+    <p:extLst>
+      <p:ext uri="{BB962C8B-B14F-4D97-AF65-F5344CB8AC3E}">
+        <p14:creationId xmlns:p14="http://schemas.microsoft.com/office/powerpoint/2010/main" val="1413919281"/>
+      </p:ext>
+    </p:extLst>
+  </p:cSld>
+  <p:clrMapOvr>
+    <a:masterClrMapping/>
+  </p:clrMapOvr>
+</p:sld>
+</file>
+
 <file path=ppt/theme/theme1.xml><?xml version="1.0" encoding="utf-8"?>
 <a:theme xmlns:a="http://schemas.openxmlformats.org/drawingml/2006/main" name="Office Theme">
   <a:themeElements>

</xml_diff>

<commit_message>
J#27080: Clarified trial-use vs normative changes in the change log
</commit_message>
<xml_diff>
--- a/docs/CQLDiagrams.pptx
+++ b/docs/CQLDiagrams.pptx
@@ -7,6 +7,7 @@
   <p:sldIdLst>
     <p:sldId id="256" r:id="rId2"/>
     <p:sldId id="257" r:id="rId3"/>
+    <p:sldId id="258" r:id="rId4"/>
   </p:sldIdLst>
   <p:sldSz cx="12192000" cy="6858000"/>
   <p:notesSz cx="6858000" cy="9144000"/>
@@ -5256,6 +5257,265 @@
 </p:sld>
 </file>
 
+<file path=ppt/slides/slide3.xml><?xml version="1.0" encoding="utf-8"?>
+<p:sld xmlns:a="http://schemas.openxmlformats.org/drawingml/2006/main" xmlns:r="http://schemas.openxmlformats.org/officeDocument/2006/relationships" xmlns:p="http://schemas.openxmlformats.org/presentationml/2006/main">
+  <p:cSld>
+    <p:spTree>
+      <p:nvGrpSpPr>
+        <p:cNvPr id="1" name=""/>
+        <p:cNvGrpSpPr/>
+        <p:nvPr/>
+      </p:nvGrpSpPr>
+      <p:grpSpPr>
+        <a:xfrm>
+          <a:off x="0" y="0"/>
+          <a:ext cx="0" cy="0"/>
+          <a:chOff x="0" y="0"/>
+          <a:chExt cx="0" cy="0"/>
+        </a:xfrm>
+      </p:grpSpPr>
+      <p:sp>
+        <p:nvSpPr>
+          <p:cNvPr id="4" name="Rectangle 3">
+            <a:extLst>
+              <a:ext uri="{FF2B5EF4-FFF2-40B4-BE49-F238E27FC236}">
+                <a16:creationId xmlns:a16="http://schemas.microsoft.com/office/drawing/2014/main" id="{19995E87-2F7A-434C-B6D1-661EB599E88D}"/>
+              </a:ext>
+            </a:extLst>
+          </p:cNvPr>
+          <p:cNvSpPr/>
+          <p:nvPr/>
+        </p:nvSpPr>
+        <p:spPr>
+          <a:xfrm>
+            <a:off x="2110952" y="3365677"/>
+            <a:ext cx="2681413" cy="463378"/>
+          </a:xfrm>
+          <a:prstGeom prst="rect">
+            <a:avLst/>
+          </a:prstGeom>
+        </p:spPr>
+        <p:style>
+          <a:lnRef idx="2">
+            <a:schemeClr val="accent1">
+              <a:shade val="50000"/>
+            </a:schemeClr>
+          </a:lnRef>
+          <a:fillRef idx="1">
+            <a:schemeClr val="accent1"/>
+          </a:fillRef>
+          <a:effectRef idx="0">
+            <a:schemeClr val="accent1"/>
+          </a:effectRef>
+          <a:fontRef idx="minor">
+            <a:schemeClr val="lt1"/>
+          </a:fontRef>
+        </p:style>
+        <p:txBody>
+          <a:bodyPr rtlCol="0" anchor="ctr"/>
+          <a:lstStyle/>
+          <a:p>
+            <a:pPr algn="ctr"/>
+            <a:r>
+              <a:rPr lang="en-US" dirty="0"/>
+              <a:t>Patient</a:t>
+            </a:r>
+          </a:p>
+        </p:txBody>
+      </p:sp>
+      <p:sp>
+        <p:nvSpPr>
+          <p:cNvPr id="5" name="Rectangle 4">
+            <a:extLst>
+              <a:ext uri="{FF2B5EF4-FFF2-40B4-BE49-F238E27FC236}">
+                <a16:creationId xmlns:a16="http://schemas.microsoft.com/office/drawing/2014/main" id="{C8F09EF7-8C64-4DC8-A450-31434EB30D98}"/>
+              </a:ext>
+            </a:extLst>
+          </p:cNvPr>
+          <p:cNvSpPr/>
+          <p:nvPr/>
+        </p:nvSpPr>
+        <p:spPr>
+          <a:xfrm>
+            <a:off x="3649367" y="4377391"/>
+            <a:ext cx="2681414" cy="463378"/>
+          </a:xfrm>
+          <a:prstGeom prst="rect">
+            <a:avLst/>
+          </a:prstGeom>
+        </p:spPr>
+        <p:style>
+          <a:lnRef idx="2">
+            <a:schemeClr val="accent1">
+              <a:shade val="50000"/>
+            </a:schemeClr>
+          </a:lnRef>
+          <a:fillRef idx="1">
+            <a:schemeClr val="accent1"/>
+          </a:fillRef>
+          <a:effectRef idx="0">
+            <a:schemeClr val="accent1"/>
+          </a:effectRef>
+          <a:fontRef idx="minor">
+            <a:schemeClr val="lt1"/>
+          </a:fontRef>
+        </p:style>
+        <p:txBody>
+          <a:bodyPr rtlCol="0" anchor="ctr"/>
+          <a:lstStyle/>
+          <a:p>
+            <a:pPr algn="ctr"/>
+            <a:r>
+              <a:rPr lang="en-US" dirty="0"/>
+              <a:t>Encounter</a:t>
+            </a:r>
+          </a:p>
+        </p:txBody>
+      </p:sp>
+      <p:cxnSp>
+        <p:nvCxnSpPr>
+          <p:cNvPr id="10" name="Straight Arrow Connector 9">
+            <a:extLst>
+              <a:ext uri="{FF2B5EF4-FFF2-40B4-BE49-F238E27FC236}">
+                <a16:creationId xmlns:a16="http://schemas.microsoft.com/office/drawing/2014/main" id="{3BEEFAC8-7BA9-44E5-AAC4-6A6B7B747DD6}"/>
+              </a:ext>
+            </a:extLst>
+          </p:cNvPr>
+          <p:cNvCxnSpPr>
+            <a:cxnSpLocks/>
+          </p:cNvCxnSpPr>
+          <p:nvPr/>
+        </p:nvCxnSpPr>
+        <p:spPr>
+          <a:xfrm flipV="1">
+            <a:off x="4164228" y="3829054"/>
+            <a:ext cx="0" cy="548337"/>
+          </a:xfrm>
+          <a:prstGeom prst="straightConnector1">
+            <a:avLst/>
+          </a:prstGeom>
+          <a:ln>
+            <a:tailEnd type="triangle"/>
+          </a:ln>
+        </p:spPr>
+        <p:style>
+          <a:lnRef idx="3">
+            <a:schemeClr val="accent1"/>
+          </a:lnRef>
+          <a:fillRef idx="0">
+            <a:schemeClr val="accent1"/>
+          </a:fillRef>
+          <a:effectRef idx="2">
+            <a:schemeClr val="accent1"/>
+          </a:effectRef>
+          <a:fontRef idx="minor">
+            <a:schemeClr val="tx1"/>
+          </a:fontRef>
+        </p:style>
+      </p:cxnSp>
+      <p:sp>
+        <p:nvSpPr>
+          <p:cNvPr id="2" name="Rectangle 1">
+            <a:extLst>
+              <a:ext uri="{FF2B5EF4-FFF2-40B4-BE49-F238E27FC236}">
+                <a16:creationId xmlns:a16="http://schemas.microsoft.com/office/drawing/2014/main" id="{C446E948-4D28-4968-8B71-CE53DB4B02CD}"/>
+              </a:ext>
+            </a:extLst>
+          </p:cNvPr>
+          <p:cNvSpPr/>
+          <p:nvPr/>
+        </p:nvSpPr>
+        <p:spPr>
+          <a:xfrm>
+            <a:off x="5233085" y="3365677"/>
+            <a:ext cx="2681413" cy="463378"/>
+          </a:xfrm>
+          <a:prstGeom prst="rect">
+            <a:avLst/>
+          </a:prstGeom>
+        </p:spPr>
+        <p:style>
+          <a:lnRef idx="2">
+            <a:schemeClr val="accent1">
+              <a:shade val="50000"/>
+            </a:schemeClr>
+          </a:lnRef>
+          <a:fillRef idx="1">
+            <a:schemeClr val="accent1"/>
+          </a:fillRef>
+          <a:effectRef idx="0">
+            <a:schemeClr val="accent1"/>
+          </a:effectRef>
+          <a:fontRef idx="minor">
+            <a:schemeClr val="lt1"/>
+          </a:fontRef>
+        </p:style>
+        <p:txBody>
+          <a:bodyPr rtlCol="0" anchor="ctr"/>
+          <a:lstStyle/>
+          <a:p>
+            <a:pPr algn="ctr"/>
+            <a:r>
+              <a:rPr lang="en-US" dirty="0"/>
+              <a:t>Practitioner</a:t>
+            </a:r>
+          </a:p>
+        </p:txBody>
+      </p:sp>
+      <p:cxnSp>
+        <p:nvCxnSpPr>
+          <p:cNvPr id="18" name="Straight Arrow Connector 17">
+            <a:extLst>
+              <a:ext uri="{FF2B5EF4-FFF2-40B4-BE49-F238E27FC236}">
+                <a16:creationId xmlns:a16="http://schemas.microsoft.com/office/drawing/2014/main" id="{72A75637-A751-4226-A769-4CB2B827A363}"/>
+              </a:ext>
+            </a:extLst>
+          </p:cNvPr>
+          <p:cNvCxnSpPr>
+            <a:cxnSpLocks/>
+          </p:cNvCxnSpPr>
+          <p:nvPr/>
+        </p:nvCxnSpPr>
+        <p:spPr>
+          <a:xfrm flipV="1">
+            <a:off x="5762369" y="3829054"/>
+            <a:ext cx="0" cy="548337"/>
+          </a:xfrm>
+          <a:prstGeom prst="straightConnector1">
+            <a:avLst/>
+          </a:prstGeom>
+          <a:ln>
+            <a:tailEnd type="triangle"/>
+          </a:ln>
+        </p:spPr>
+        <p:style>
+          <a:lnRef idx="3">
+            <a:schemeClr val="accent1"/>
+          </a:lnRef>
+          <a:fillRef idx="0">
+            <a:schemeClr val="accent1"/>
+          </a:fillRef>
+          <a:effectRef idx="2">
+            <a:schemeClr val="accent1"/>
+          </a:effectRef>
+          <a:fontRef idx="minor">
+            <a:schemeClr val="tx1"/>
+          </a:fontRef>
+        </p:style>
+      </p:cxnSp>
+    </p:spTree>
+    <p:extLst>
+      <p:ext uri="{BB962C8B-B14F-4D97-AF65-F5344CB8AC3E}">
+        <p14:creationId xmlns:p14="http://schemas.microsoft.com/office/powerpoint/2010/main" val="4151489679"/>
+      </p:ext>
+    </p:extLst>
+  </p:cSld>
+  <p:clrMapOvr>
+    <a:masterClrMapping/>
+  </p:clrMapOvr>
+</p:sld>
+</file>
+
 <file path=ppt/theme/theme1.xml><?xml version="1.0" encoding="utf-8"?>
 <a:theme xmlns:a="http://schemas.openxmlformats.org/drawingml/2006/main" name="Office Theme">
   <a:themeElements>

</xml_diff>